<commit_message>
Verslag1: Aanpak En Planning
</commit_message>
<xml_diff>
--- a/CoolTeam_Structure.pptx
+++ b/CoolTeam_Structure.pptx
@@ -313,7 +313,7 @@
           <a:p>
             <a:fld id="{81BD6F2A-F09A-E442-B72D-6C4EEE953D34}" type="slidenum">
               <a:rPr lang="en-GB" smtClean="0"/>
-              <a:t>‹#›</a:t>
+              <a:t>‹nr.›</a:t>
             </a:fld>
             <a:endParaRPr lang="en-GB"/>
           </a:p>
@@ -511,7 +511,7 @@
           <a:p>
             <a:fld id="{81BD6F2A-F09A-E442-B72D-6C4EEE953D34}" type="slidenum">
               <a:rPr lang="en-GB" smtClean="0"/>
-              <a:t>‹#›</a:t>
+              <a:t>‹nr.›</a:t>
             </a:fld>
             <a:endParaRPr lang="en-GB"/>
           </a:p>
@@ -719,7 +719,7 @@
           <a:p>
             <a:fld id="{81BD6F2A-F09A-E442-B72D-6C4EEE953D34}" type="slidenum">
               <a:rPr lang="en-GB" smtClean="0"/>
-              <a:t>‹#›</a:t>
+              <a:t>‹nr.›</a:t>
             </a:fld>
             <a:endParaRPr lang="en-GB"/>
           </a:p>
@@ -917,7 +917,7 @@
           <a:p>
             <a:fld id="{81BD6F2A-F09A-E442-B72D-6C4EEE953D34}" type="slidenum">
               <a:rPr lang="en-GB" smtClean="0"/>
-              <a:t>‹#›</a:t>
+              <a:t>‹nr.›</a:t>
             </a:fld>
             <a:endParaRPr lang="en-GB"/>
           </a:p>
@@ -1192,7 +1192,7 @@
           <a:p>
             <a:fld id="{81BD6F2A-F09A-E442-B72D-6C4EEE953D34}" type="slidenum">
               <a:rPr lang="en-GB" smtClean="0"/>
-              <a:t>‹#›</a:t>
+              <a:t>‹nr.›</a:t>
             </a:fld>
             <a:endParaRPr lang="en-GB"/>
           </a:p>
@@ -1457,7 +1457,7 @@
           <a:p>
             <a:fld id="{81BD6F2A-F09A-E442-B72D-6C4EEE953D34}" type="slidenum">
               <a:rPr lang="en-GB" smtClean="0"/>
-              <a:t>‹#›</a:t>
+              <a:t>‹nr.›</a:t>
             </a:fld>
             <a:endParaRPr lang="en-GB"/>
           </a:p>
@@ -1869,7 +1869,7 @@
           <a:p>
             <a:fld id="{81BD6F2A-F09A-E442-B72D-6C4EEE953D34}" type="slidenum">
               <a:rPr lang="en-GB" smtClean="0"/>
-              <a:t>‹#›</a:t>
+              <a:t>‹nr.›</a:t>
             </a:fld>
             <a:endParaRPr lang="en-GB"/>
           </a:p>
@@ -2010,7 +2010,7 @@
           <a:p>
             <a:fld id="{81BD6F2A-F09A-E442-B72D-6C4EEE953D34}" type="slidenum">
               <a:rPr lang="en-GB" smtClean="0"/>
-              <a:t>‹#›</a:t>
+              <a:t>‹nr.›</a:t>
             </a:fld>
             <a:endParaRPr lang="en-GB"/>
           </a:p>
@@ -2123,7 +2123,7 @@
           <a:p>
             <a:fld id="{81BD6F2A-F09A-E442-B72D-6C4EEE953D34}" type="slidenum">
               <a:rPr lang="en-GB" smtClean="0"/>
-              <a:t>‹#›</a:t>
+              <a:t>‹nr.›</a:t>
             </a:fld>
             <a:endParaRPr lang="en-GB"/>
           </a:p>
@@ -2434,7 +2434,7 @@
           <a:p>
             <a:fld id="{81BD6F2A-F09A-E442-B72D-6C4EEE953D34}" type="slidenum">
               <a:rPr lang="en-GB" smtClean="0"/>
-              <a:t>‹#›</a:t>
+              <a:t>‹nr.›</a:t>
             </a:fld>
             <a:endParaRPr lang="en-GB"/>
           </a:p>
@@ -2722,7 +2722,7 @@
           <a:p>
             <a:fld id="{81BD6F2A-F09A-E442-B72D-6C4EEE953D34}" type="slidenum">
               <a:rPr lang="en-GB" smtClean="0"/>
-              <a:t>‹#›</a:t>
+              <a:t>‹nr.›</a:t>
             </a:fld>
             <a:endParaRPr lang="en-GB"/>
           </a:p>
@@ -2999,7 +2999,7 @@
           <a:p>
             <a:fld id="{81BD6F2A-F09A-E442-B72D-6C4EEE953D34}" type="slidenum">
               <a:rPr lang="en-GB" smtClean="0"/>
-              <a:t>‹#›</a:t>
+              <a:t>‹nr.›</a:t>
             </a:fld>
             <a:endParaRPr lang="en-GB"/>
           </a:p>
@@ -3340,7 +3340,7 @@
         </p:nvSpPr>
         <p:spPr>
           <a:xfrm>
-            <a:off x="614364" y="528638"/>
+            <a:off x="646423" y="514350"/>
             <a:ext cx="5276074" cy="5829300"/>
           </a:xfrm>
           <a:prstGeom prst="rect">
@@ -3386,8 +3386,8 @@
         </p:nvSpPr>
         <p:spPr>
           <a:xfrm>
-            <a:off x="7070652" y="528638"/>
-            <a:ext cx="4865281" cy="5829300"/>
+            <a:off x="7070653" y="528638"/>
+            <a:ext cx="2842698" cy="4176712"/>
           </a:xfrm>
           <a:prstGeom prst="rect">
             <a:avLst/>
@@ -3452,78 +3452,46 @@
                   <a:schemeClr val="bg1"/>
                 </a:solidFill>
               </a:rPr>
-              <a:t>PCB1 (</a:t>
-            </a:r>
-            <a:r>
-              <a:rPr lang="en-GB" dirty="0" err="1">
-                <a:solidFill>
-                  <a:schemeClr val="bg1"/>
-                </a:solidFill>
-              </a:rPr>
-              <a:t>buiten</a:t>
-            </a:r>
+              <a:t>PCB1 (buiten)</a:t>
+            </a:r>
+          </a:p>
+        </p:txBody>
+      </p:sp>
+      <p:sp>
+        <p:nvSpPr>
+          <p:cNvPr id="7" name="TextBox 6">
+            <a:extLst>
+              <a:ext uri="{FF2B5EF4-FFF2-40B4-BE49-F238E27FC236}">
+                <a16:creationId xmlns:a16="http://schemas.microsoft.com/office/drawing/2014/main" id="{F6CA97CE-A543-5342-80F8-792E3DBD06BE}"/>
+              </a:ext>
+            </a:extLst>
+          </p:cNvPr>
+          <p:cNvSpPr txBox="1"/>
+          <p:nvPr/>
+        </p:nvSpPr>
+        <p:spPr>
+          <a:xfrm>
+            <a:off x="7223050" y="627321"/>
+            <a:ext cx="1580707" cy="369332"/>
+          </a:xfrm>
+          <a:prstGeom prst="rect">
+            <a:avLst/>
+          </a:prstGeom>
+          <a:noFill/>
+        </p:spPr>
+        <p:txBody>
+          <a:bodyPr wrap="square" rtlCol="0">
+            <a:spAutoFit/>
+          </a:bodyPr>
+          <a:lstStyle/>
+          <a:p>
             <a:r>
               <a:rPr lang="en-GB" dirty="0">
                 <a:solidFill>
                   <a:schemeClr val="bg1"/>
                 </a:solidFill>
               </a:rPr>
-              <a:t>)</a:t>
-            </a:r>
-          </a:p>
-        </p:txBody>
-      </p:sp>
-      <p:sp>
-        <p:nvSpPr>
-          <p:cNvPr id="7" name="TextBox 6">
-            <a:extLst>
-              <a:ext uri="{FF2B5EF4-FFF2-40B4-BE49-F238E27FC236}">
-                <a16:creationId xmlns:a16="http://schemas.microsoft.com/office/drawing/2014/main" id="{F6CA97CE-A543-5342-80F8-792E3DBD06BE}"/>
-              </a:ext>
-            </a:extLst>
-          </p:cNvPr>
-          <p:cNvSpPr txBox="1"/>
-          <p:nvPr/>
-        </p:nvSpPr>
-        <p:spPr>
-          <a:xfrm>
-            <a:off x="7223050" y="627321"/>
-            <a:ext cx="1580707" cy="369332"/>
-          </a:xfrm>
-          <a:prstGeom prst="rect">
-            <a:avLst/>
-          </a:prstGeom>
-          <a:noFill/>
-        </p:spPr>
-        <p:txBody>
-          <a:bodyPr wrap="square" rtlCol="0">
-            <a:spAutoFit/>
-          </a:bodyPr>
-          <a:lstStyle/>
-          <a:p>
-            <a:r>
-              <a:rPr lang="en-GB" dirty="0">
-                <a:solidFill>
-                  <a:schemeClr val="bg1"/>
-                </a:solidFill>
-              </a:rPr>
-              <a:t>PCB2 (</a:t>
-            </a:r>
-            <a:r>
-              <a:rPr lang="en-GB" dirty="0" err="1">
-                <a:solidFill>
-                  <a:schemeClr val="bg1"/>
-                </a:solidFill>
-              </a:rPr>
-              <a:t>binnen</a:t>
-            </a:r>
-            <a:r>
-              <a:rPr lang="en-GB" dirty="0">
-                <a:solidFill>
-                  <a:schemeClr val="bg1"/>
-                </a:solidFill>
-              </a:rPr>
-              <a:t>)</a:t>
+              <a:t>PCB2 (binnen)</a:t>
             </a:r>
           </a:p>
         </p:txBody>
@@ -3711,15 +3679,7 @@
             <a:pPr algn="ctr"/>
             <a:r>
               <a:rPr lang="en-GB" dirty="0"/>
-              <a:t>Hall-sensor (</a:t>
-            </a:r>
-            <a:r>
-              <a:rPr lang="en-GB" dirty="0" err="1"/>
-              <a:t>deur</a:t>
-            </a:r>
-            <a:r>
-              <a:rPr lang="en-GB" dirty="0"/>
-              <a:t>)</a:t>
+              <a:t>Hall-sensor (deur)</a:t>
             </a:r>
           </a:p>
         </p:txBody>
@@ -3976,10 +3936,9 @@
           <a:p>
             <a:pPr algn="ctr"/>
             <a:r>
-              <a:rPr lang="en-GB" dirty="0" err="1"/>
+              <a:rPr lang="en-GB" dirty="0"/>
               <a:t>LoRaWAN</a:t>
             </a:r>
-            <a:endParaRPr lang="en-GB" dirty="0"/>
           </a:p>
         </p:txBody>
       </p:sp>
@@ -4026,10 +3985,9 @@
           <a:p>
             <a:pPr algn="ctr"/>
             <a:r>
-              <a:rPr lang="en-GB" dirty="0" err="1"/>
+              <a:rPr lang="en-GB" dirty="0"/>
               <a:t>Antenne</a:t>
             </a:r>
-            <a:endParaRPr lang="en-GB" dirty="0"/>
           </a:p>
         </p:txBody>
       </p:sp>
@@ -4076,10 +4034,9 @@
           <a:p>
             <a:pPr algn="ctr"/>
             <a:r>
-              <a:rPr lang="en-GB" dirty="0" err="1"/>
+              <a:rPr lang="en-GB" dirty="0"/>
               <a:t>Antenne</a:t>
             </a:r>
-            <a:endParaRPr lang="en-GB" dirty="0"/>
           </a:p>
         </p:txBody>
       </p:sp>
@@ -4289,8 +4246,8 @@
         </p:nvCxnSpPr>
         <p:spPr>
           <a:xfrm>
-            <a:off x="3078125" y="1741819"/>
-            <a:ext cx="0" cy="1533894"/>
+            <a:off x="3078125" y="1756066"/>
+            <a:ext cx="0" cy="1519647"/>
           </a:xfrm>
           <a:prstGeom prst="line">
             <a:avLst/>
@@ -4360,14 +4317,13 @@
           </p:cNvPr>
           <p:cNvCxnSpPr>
             <a:cxnSpLocks/>
-            <a:stCxn id="41" idx="6"/>
           </p:cNvCxnSpPr>
           <p:nvPr/>
         </p:nvCxnSpPr>
         <p:spPr>
           <a:xfrm flipH="1" flipV="1">
-            <a:off x="2946298" y="1508491"/>
-            <a:ext cx="361024" cy="6412"/>
+            <a:off x="2958300" y="1514070"/>
+            <a:ext cx="294103" cy="1"/>
           </a:xfrm>
           <a:prstGeom prst="line">
             <a:avLst/>
@@ -4404,7 +4360,7 @@
         </p:nvCxnSpPr>
         <p:spPr>
           <a:xfrm flipH="1">
-            <a:off x="2965776" y="1744808"/>
+            <a:off x="2924423" y="1756066"/>
             <a:ext cx="153702" cy="0"/>
           </a:xfrm>
           <a:prstGeom prst="line">
@@ -4426,98 +4382,6 @@
           </a:fontRef>
         </p:style>
       </p:cxnSp>
-      <p:sp>
-        <p:nvSpPr>
-          <p:cNvPr id="41" name="Oval 40">
-            <a:extLst>
-              <a:ext uri="{FF2B5EF4-FFF2-40B4-BE49-F238E27FC236}">
-                <a16:creationId xmlns:a16="http://schemas.microsoft.com/office/drawing/2014/main" id="{BB6C3EB4-A779-CF41-ACC1-2358D5D9F278}"/>
-              </a:ext>
-            </a:extLst>
-          </p:cNvPr>
-          <p:cNvSpPr/>
-          <p:nvPr/>
-        </p:nvSpPr>
-        <p:spPr>
-          <a:xfrm>
-            <a:off x="3199322" y="1460903"/>
-            <a:ext cx="108000" cy="108000"/>
-          </a:xfrm>
-          <a:prstGeom prst="ellipse">
-            <a:avLst/>
-          </a:prstGeom>
-        </p:spPr>
-        <p:style>
-          <a:lnRef idx="2">
-            <a:schemeClr val="accent3">
-              <a:shade val="50000"/>
-            </a:schemeClr>
-          </a:lnRef>
-          <a:fillRef idx="1">
-            <a:schemeClr val="accent3"/>
-          </a:fillRef>
-          <a:effectRef idx="0">
-            <a:schemeClr val="accent3"/>
-          </a:effectRef>
-          <a:fontRef idx="minor">
-            <a:schemeClr val="lt1"/>
-          </a:fontRef>
-        </p:style>
-        <p:txBody>
-          <a:bodyPr rtlCol="0" anchor="ctr"/>
-          <a:lstStyle/>
-          <a:p>
-            <a:pPr algn="ctr"/>
-            <a:endParaRPr lang="en-GB"/>
-          </a:p>
-        </p:txBody>
-      </p:sp>
-      <p:sp>
-        <p:nvSpPr>
-          <p:cNvPr id="42" name="Oval 41">
-            <a:extLst>
-              <a:ext uri="{FF2B5EF4-FFF2-40B4-BE49-F238E27FC236}">
-                <a16:creationId xmlns:a16="http://schemas.microsoft.com/office/drawing/2014/main" id="{C963C250-5C4E-1948-A48D-25BF349D5A95}"/>
-              </a:ext>
-            </a:extLst>
-          </p:cNvPr>
-          <p:cNvSpPr/>
-          <p:nvPr/>
-        </p:nvSpPr>
-        <p:spPr>
-          <a:xfrm>
-            <a:off x="3011478" y="1687734"/>
-            <a:ext cx="108000" cy="108000"/>
-          </a:xfrm>
-          <a:prstGeom prst="ellipse">
-            <a:avLst/>
-          </a:prstGeom>
-        </p:spPr>
-        <p:style>
-          <a:lnRef idx="2">
-            <a:schemeClr val="accent3">
-              <a:shade val="50000"/>
-            </a:schemeClr>
-          </a:lnRef>
-          <a:fillRef idx="1">
-            <a:schemeClr val="accent3"/>
-          </a:fillRef>
-          <a:effectRef idx="0">
-            <a:schemeClr val="accent3"/>
-          </a:effectRef>
-          <a:fontRef idx="minor">
-            <a:schemeClr val="lt1"/>
-          </a:fontRef>
-        </p:style>
-        <p:txBody>
-          <a:bodyPr rtlCol="0" anchor="ctr"/>
-          <a:lstStyle/>
-          <a:p>
-            <a:pPr algn="ctr"/>
-            <a:endParaRPr lang="en-GB"/>
-          </a:p>
-        </p:txBody>
-      </p:sp>
       <p:cxnSp>
         <p:nvCxnSpPr>
           <p:cNvPr id="44" name="Straight Connector 43">
@@ -4609,7 +4473,7 @@
         </p:nvSpPr>
         <p:spPr>
           <a:xfrm>
-            <a:off x="3405411" y="3008018"/>
+            <a:off x="3353215" y="2798122"/>
             <a:ext cx="482824" cy="369332"/>
           </a:xfrm>
           <a:prstGeom prst="rect">
@@ -4997,8 +4861,8 @@
         </p:nvSpPr>
         <p:spPr>
           <a:xfrm>
-            <a:off x="2410457" y="3281028"/>
-            <a:ext cx="543339" cy="369332"/>
+            <a:off x="2278650" y="3397079"/>
+            <a:ext cx="1213412" cy="369332"/>
           </a:xfrm>
           <a:prstGeom prst="rect">
             <a:avLst/>
@@ -5013,7 +4877,7 @@
           <a:p>
             <a:r>
               <a:rPr lang="en-GB" dirty="0"/>
-              <a:t>?</a:t>
+              <a:t>Analoog</a:t>
             </a:r>
           </a:p>
         </p:txBody>
@@ -5032,7 +4896,7 @@
         </p:nvSpPr>
         <p:spPr>
           <a:xfrm>
-            <a:off x="6321679" y="3275713"/>
+            <a:off x="6256345" y="3046764"/>
             <a:ext cx="543339" cy="369332"/>
           </a:xfrm>
           <a:prstGeom prst="rect">
@@ -5143,7 +5007,7 @@
         </p:nvSpPr>
         <p:spPr>
           <a:xfrm>
-            <a:off x="3975798" y="2322579"/>
+            <a:off x="4291544" y="2373919"/>
             <a:ext cx="695127" cy="369332"/>
           </a:xfrm>
           <a:prstGeom prst="rect">
@@ -5164,6 +5028,82 @@
           </a:p>
         </p:txBody>
       </p:sp>
+      <p:cxnSp>
+        <p:nvCxnSpPr>
+          <p:cNvPr id="48" name="Straight Connector 44">
+            <a:extLst>
+              <a:ext uri="{FF2B5EF4-FFF2-40B4-BE49-F238E27FC236}">
+                <a16:creationId xmlns:a16="http://schemas.microsoft.com/office/drawing/2014/main" id="{CDBD3841-8FF2-47B2-833A-C0FC087272EB}"/>
+              </a:ext>
+            </a:extLst>
+          </p:cNvPr>
+          <p:cNvCxnSpPr>
+            <a:cxnSpLocks/>
+          </p:cNvCxnSpPr>
+          <p:nvPr/>
+        </p:nvCxnSpPr>
+        <p:spPr>
+          <a:xfrm flipH="1">
+            <a:off x="5486400" y="3581745"/>
+            <a:ext cx="2879100" cy="0"/>
+          </a:xfrm>
+          <a:prstGeom prst="line">
+            <a:avLst/>
+          </a:prstGeom>
+        </p:spPr>
+        <p:style>
+          <a:lnRef idx="3">
+            <a:schemeClr val="accent3"/>
+          </a:lnRef>
+          <a:fillRef idx="0">
+            <a:schemeClr val="accent3"/>
+          </a:fillRef>
+          <a:effectRef idx="2">
+            <a:schemeClr val="accent3"/>
+          </a:effectRef>
+          <a:fontRef idx="minor">
+            <a:schemeClr val="tx1"/>
+          </a:fontRef>
+        </p:style>
+      </p:cxnSp>
+      <p:cxnSp>
+        <p:nvCxnSpPr>
+          <p:cNvPr id="52" name="Straight Connector 43">
+            <a:extLst>
+              <a:ext uri="{FF2B5EF4-FFF2-40B4-BE49-F238E27FC236}">
+                <a16:creationId xmlns:a16="http://schemas.microsoft.com/office/drawing/2014/main" id="{4E13C3FD-025E-468A-ACC3-99D979FE6659}"/>
+              </a:ext>
+            </a:extLst>
+          </p:cNvPr>
+          <p:cNvCxnSpPr>
+            <a:cxnSpLocks/>
+          </p:cNvCxnSpPr>
+          <p:nvPr/>
+        </p:nvCxnSpPr>
+        <p:spPr>
+          <a:xfrm>
+            <a:off x="8365500" y="2264917"/>
+            <a:ext cx="0" cy="1316828"/>
+          </a:xfrm>
+          <a:prstGeom prst="line">
+            <a:avLst/>
+          </a:prstGeom>
+        </p:spPr>
+        <p:style>
+          <a:lnRef idx="3">
+            <a:schemeClr val="accent3"/>
+          </a:lnRef>
+          <a:fillRef idx="0">
+            <a:schemeClr val="accent3"/>
+          </a:fillRef>
+          <a:effectRef idx="2">
+            <a:schemeClr val="accent3"/>
+          </a:effectRef>
+          <a:fontRef idx="minor">
+            <a:schemeClr val="tx1"/>
+          </a:fontRef>
+        </p:style>
+      </p:cxnSp>
     </p:spTree>
     <p:extLst>
       <p:ext uri="{BB962C8B-B14F-4D97-AF65-F5344CB8AC3E}">

</xml_diff>